<commit_message>
change topic, add ref&data
</commit_message>
<xml_diff>
--- a/PPTGroup10.pptx
+++ b/PPTGroup10.pptx
@@ -213,7 +213,7 @@
           <a:p>
             <a:fld id="{921DB55A-F66E-884C-A409-CC81ACA880E7}" type="datetimeFigureOut">
               <a:rPr lang="en-US" smtClean="0"/>
-              <a:t>3/3/17</a:t>
+              <a:t>3/21/17</a:t>
             </a:fld>
             <a:endParaRPr lang="en-US"/>
           </a:p>
@@ -525,6 +525,35 @@
           <a:bodyPr/>
           <a:lstStyle/>
           <a:p>
+            <a:pPr marL="228600" indent="-228600">
+              <a:buAutoNum type="arabicPeriod"/>
+            </a:pPr>
+            <a:r>
+              <a:rPr lang="en-US" dirty="0" smtClean="0"/>
+              <a:t>a bunch of anti-virus</a:t>
+            </a:r>
+            <a:r>
+              <a:rPr lang="en-US" baseline="0" dirty="0" smtClean="0"/>
+              <a:t> software, detecting malicious apps/binaries</a:t>
+            </a:r>
+          </a:p>
+          <a:p>
+            <a:pPr marL="228600" indent="-228600">
+              <a:buAutoNum type="arabicPeriod"/>
+            </a:pPr>
+            <a:r>
+              <a:rPr lang="en-US" baseline="0" dirty="0" smtClean="0"/>
+              <a:t>No interested in detecting , but</a:t>
+            </a:r>
+          </a:p>
+          <a:p>
+            <a:pPr marL="228600" indent="-228600">
+              <a:buAutoNum type="arabicPeriod"/>
+            </a:pPr>
+            <a:r>
+              <a:rPr lang="en-US" baseline="0" dirty="0" smtClean="0"/>
+              <a:t>However, to learn how to evade detection, first, </a:t>
+            </a:r>
             <a:endParaRPr lang="en-US" dirty="0"/>
           </a:p>
         </p:txBody>
@@ -546,7 +575,7 @@
           <a:p>
             <a:fld id="{1C63729A-534C-874A-B073-5D3F38B81A78}" type="slidenum">
               <a:rPr lang="en-US" smtClean="0"/>
-              <a:t>4</a:t>
+              <a:t>2</a:t>
             </a:fld>
             <a:endParaRPr lang="en-US"/>
           </a:p>
@@ -555,7 +584,7 @@
     </p:spTree>
     <p:extLst>
       <p:ext uri="{BB962C8B-B14F-4D97-AF65-F5344CB8AC3E}">
-        <p14:creationId xmlns:p14="http://schemas.microsoft.com/office/powerpoint/2010/main" val="1846938652"/>
+        <p14:creationId xmlns:p14="http://schemas.microsoft.com/office/powerpoint/2010/main" val="150517567"/>
       </p:ext>
     </p:extLst>
   </p:cSld>
@@ -609,6 +638,24 @@
           <a:bodyPr/>
           <a:lstStyle/>
           <a:p>
+            <a:r>
+              <a:rPr lang="en-US" dirty="0" smtClean="0"/>
+              <a:t>NO many</a:t>
+            </a:r>
+            <a:r>
+              <a:rPr lang="en-US" baseline="0" dirty="0" smtClean="0"/>
+              <a:t> </a:t>
+            </a:r>
+            <a:r>
+              <a:rPr lang="en-US" dirty="0" smtClean="0"/>
+              <a:t>dataset we</a:t>
+            </a:r>
+            <a:r>
+              <a:rPr lang="en-US" baseline="0" dirty="0" smtClean="0"/>
+              <a:t> can find.</a:t>
+            </a:r>
+          </a:p>
+          <a:p>
             <a:endParaRPr lang="en-US" dirty="0"/>
           </a:p>
         </p:txBody>
@@ -630,7 +677,7 @@
           <a:p>
             <a:fld id="{1C63729A-534C-874A-B073-5D3F38B81A78}" type="slidenum">
               <a:rPr lang="en-US" smtClean="0"/>
-              <a:t>5</a:t>
+              <a:t>3</a:t>
             </a:fld>
             <a:endParaRPr lang="en-US"/>
           </a:p>
@@ -639,7 +686,7 @@
     </p:spTree>
     <p:extLst>
       <p:ext uri="{BB962C8B-B14F-4D97-AF65-F5344CB8AC3E}">
-        <p14:creationId xmlns:p14="http://schemas.microsoft.com/office/powerpoint/2010/main" val="1186452551"/>
+        <p14:creationId xmlns:p14="http://schemas.microsoft.com/office/powerpoint/2010/main" val="1887658390"/>
       </p:ext>
     </p:extLst>
   </p:cSld>
@@ -693,6 +740,174 @@
           <a:bodyPr/>
           <a:lstStyle/>
           <a:p>
+            <a:endParaRPr lang="en-US" dirty="0"/>
+          </a:p>
+        </p:txBody>
+      </p:sp>
+      <p:sp>
+        <p:nvSpPr>
+          <p:cNvPr id="4" name="Slide Number Placeholder 3"/>
+          <p:cNvSpPr>
+            <a:spLocks noGrp="1"/>
+          </p:cNvSpPr>
+          <p:nvPr>
+            <p:ph type="sldNum" sz="quarter" idx="10"/>
+          </p:nvPr>
+        </p:nvSpPr>
+        <p:spPr/>
+        <p:txBody>
+          <a:bodyPr/>
+          <a:lstStyle/>
+          <a:p>
+            <a:fld id="{1C63729A-534C-874A-B073-5D3F38B81A78}" type="slidenum">
+              <a:rPr lang="en-US" smtClean="0"/>
+              <a:t>4</a:t>
+            </a:fld>
+            <a:endParaRPr lang="en-US"/>
+          </a:p>
+        </p:txBody>
+      </p:sp>
+    </p:spTree>
+    <p:extLst>
+      <p:ext uri="{BB962C8B-B14F-4D97-AF65-F5344CB8AC3E}">
+        <p14:creationId xmlns:p14="http://schemas.microsoft.com/office/powerpoint/2010/main" val="1846938652"/>
+      </p:ext>
+    </p:extLst>
+  </p:cSld>
+  <p:clrMapOvr>
+    <a:masterClrMapping/>
+  </p:clrMapOvr>
+</p:notes>
+</file>
+
+<file path=ppt/notesSlides/notesSlide4.xml><?xml version="1.0" encoding="utf-8"?>
+<p:notes xmlns:a="http://schemas.openxmlformats.org/drawingml/2006/main" xmlns:r="http://schemas.openxmlformats.org/officeDocument/2006/relationships" xmlns:p="http://schemas.openxmlformats.org/presentationml/2006/main">
+  <p:cSld>
+    <p:spTree>
+      <p:nvGrpSpPr>
+        <p:cNvPr id="1" name=""/>
+        <p:cNvGrpSpPr/>
+        <p:nvPr/>
+      </p:nvGrpSpPr>
+      <p:grpSpPr>
+        <a:xfrm>
+          <a:off x="0" y="0"/>
+          <a:ext cx="0" cy="0"/>
+          <a:chOff x="0" y="0"/>
+          <a:chExt cx="0" cy="0"/>
+        </a:xfrm>
+      </p:grpSpPr>
+      <p:sp>
+        <p:nvSpPr>
+          <p:cNvPr id="2" name="Slide Image Placeholder 1"/>
+          <p:cNvSpPr>
+            <a:spLocks noGrp="1" noRot="1" noChangeAspect="1"/>
+          </p:cNvSpPr>
+          <p:nvPr>
+            <p:ph type="sldImg"/>
+          </p:nvPr>
+        </p:nvSpPr>
+        <p:spPr/>
+      </p:sp>
+      <p:sp>
+        <p:nvSpPr>
+          <p:cNvPr id="3" name="Notes Placeholder 2"/>
+          <p:cNvSpPr>
+            <a:spLocks noGrp="1"/>
+          </p:cNvSpPr>
+          <p:nvPr>
+            <p:ph type="body" idx="1"/>
+          </p:nvPr>
+        </p:nvSpPr>
+        <p:spPr/>
+        <p:txBody>
+          <a:bodyPr/>
+          <a:lstStyle/>
+          <a:p>
+            <a:endParaRPr lang="en-US" dirty="0"/>
+          </a:p>
+        </p:txBody>
+      </p:sp>
+      <p:sp>
+        <p:nvSpPr>
+          <p:cNvPr id="4" name="Slide Number Placeholder 3"/>
+          <p:cNvSpPr>
+            <a:spLocks noGrp="1"/>
+          </p:cNvSpPr>
+          <p:nvPr>
+            <p:ph type="sldNum" sz="quarter" idx="10"/>
+          </p:nvPr>
+        </p:nvSpPr>
+        <p:spPr/>
+        <p:txBody>
+          <a:bodyPr/>
+          <a:lstStyle/>
+          <a:p>
+            <a:fld id="{1C63729A-534C-874A-B073-5D3F38B81A78}" type="slidenum">
+              <a:rPr lang="en-US" smtClean="0"/>
+              <a:t>5</a:t>
+            </a:fld>
+            <a:endParaRPr lang="en-US"/>
+          </a:p>
+        </p:txBody>
+      </p:sp>
+    </p:spTree>
+    <p:extLst>
+      <p:ext uri="{BB962C8B-B14F-4D97-AF65-F5344CB8AC3E}">
+        <p14:creationId xmlns:p14="http://schemas.microsoft.com/office/powerpoint/2010/main" val="1186452551"/>
+      </p:ext>
+    </p:extLst>
+  </p:cSld>
+  <p:clrMapOvr>
+    <a:masterClrMapping/>
+  </p:clrMapOvr>
+</p:notes>
+</file>
+
+<file path=ppt/notesSlides/notesSlide5.xml><?xml version="1.0" encoding="utf-8"?>
+<p:notes xmlns:a="http://schemas.openxmlformats.org/drawingml/2006/main" xmlns:r="http://schemas.openxmlformats.org/officeDocument/2006/relationships" xmlns:p="http://schemas.openxmlformats.org/presentationml/2006/main">
+  <p:cSld>
+    <p:spTree>
+      <p:nvGrpSpPr>
+        <p:cNvPr id="1" name=""/>
+        <p:cNvGrpSpPr/>
+        <p:nvPr/>
+      </p:nvGrpSpPr>
+      <p:grpSpPr>
+        <a:xfrm>
+          <a:off x="0" y="0"/>
+          <a:ext cx="0" cy="0"/>
+          <a:chOff x="0" y="0"/>
+          <a:chExt cx="0" cy="0"/>
+        </a:xfrm>
+      </p:grpSpPr>
+      <p:sp>
+        <p:nvSpPr>
+          <p:cNvPr id="2" name="Slide Image Placeholder 1"/>
+          <p:cNvSpPr>
+            <a:spLocks noGrp="1" noRot="1" noChangeAspect="1"/>
+          </p:cNvSpPr>
+          <p:nvPr>
+            <p:ph type="sldImg"/>
+          </p:nvPr>
+        </p:nvSpPr>
+        <p:spPr/>
+      </p:sp>
+      <p:sp>
+        <p:nvSpPr>
+          <p:cNvPr id="3" name="Notes Placeholder 2"/>
+          <p:cNvSpPr>
+            <a:spLocks noGrp="1"/>
+          </p:cNvSpPr>
+          <p:nvPr>
+            <p:ph type="body" idx="1"/>
+          </p:nvPr>
+        </p:nvSpPr>
+        <p:spPr/>
+        <p:txBody>
+          <a:bodyPr/>
+          <a:lstStyle/>
+          <a:p>
             <a:r>
               <a:rPr lang="en-US" dirty="0" smtClean="0"/>
               <a:t>Only change one parameter at</a:t>
@@ -741,7 +956,7 @@
 </p:notes>
 </file>
 
-<file path=ppt/notesSlides/notesSlide4.xml><?xml version="1.0" encoding="utf-8"?>
+<file path=ppt/notesSlides/notesSlide6.xml><?xml version="1.0" encoding="utf-8"?>
 <p:notes xmlns:a="http://schemas.openxmlformats.org/drawingml/2006/main" xmlns:r="http://schemas.openxmlformats.org/officeDocument/2006/relationships" xmlns:p="http://schemas.openxmlformats.org/presentationml/2006/main">
   <p:cSld>
     <p:spTree>
@@ -1014,7 +1229,7 @@
             <a:fld id="{B61BEF0D-F0BB-DE4B-95CE-6DB70DBA9567}" type="datetimeFigureOut">
               <a:rPr lang="en-US" dirty="0"/>
               <a:pPr/>
-              <a:t>3/3/17</a:t>
+              <a:t>3/21/17</a:t>
             </a:fld>
             <a:endParaRPr lang="en-US" dirty="0"/>
           </a:p>
@@ -1349,7 +1564,7 @@
             <a:fld id="{B61BEF0D-F0BB-DE4B-95CE-6DB70DBA9567}" type="datetimeFigureOut">
               <a:rPr lang="en-US" dirty="0"/>
               <a:pPr/>
-              <a:t>3/3/17</a:t>
+              <a:t>3/21/17</a:t>
             </a:fld>
             <a:endParaRPr lang="en-US" dirty="0"/>
           </a:p>
@@ -1747,7 +1962,7 @@
             <a:fld id="{B61BEF0D-F0BB-DE4B-95CE-6DB70DBA9567}" type="datetimeFigureOut">
               <a:rPr lang="en-US" dirty="0"/>
               <a:pPr/>
-              <a:t>3/3/17</a:t>
+              <a:t>3/21/17</a:t>
             </a:fld>
             <a:endParaRPr lang="en-US" dirty="0"/>
           </a:p>
@@ -2080,7 +2295,7 @@
             <a:fld id="{B61BEF0D-F0BB-DE4B-95CE-6DB70DBA9567}" type="datetimeFigureOut">
               <a:rPr lang="en-US" dirty="0"/>
               <a:pPr/>
-              <a:t>3/3/17</a:t>
+              <a:t>3/21/17</a:t>
             </a:fld>
             <a:endParaRPr lang="en-US" dirty="0"/>
           </a:p>
@@ -2397,7 +2612,7 @@
             <a:fld id="{B61BEF0D-F0BB-DE4B-95CE-6DB70DBA9567}" type="datetimeFigureOut">
               <a:rPr lang="en-US" dirty="0"/>
               <a:pPr/>
-              <a:t>3/3/17</a:t>
+              <a:t>3/21/17</a:t>
             </a:fld>
             <a:endParaRPr lang="en-US" dirty="0"/>
           </a:p>
@@ -2790,7 +3005,7 @@
             <a:fld id="{B61BEF0D-F0BB-DE4B-95CE-6DB70DBA9567}" type="datetimeFigureOut">
               <a:rPr lang="en-US" dirty="0"/>
               <a:pPr/>
-              <a:t>3/3/17</a:t>
+              <a:t>3/21/17</a:t>
             </a:fld>
             <a:endParaRPr lang="en-US" dirty="0"/>
           </a:p>
@@ -3044,7 +3259,7 @@
             <a:fld id="{B61BEF0D-F0BB-DE4B-95CE-6DB70DBA9567}" type="datetimeFigureOut">
               <a:rPr lang="en-US" dirty="0"/>
               <a:pPr/>
-              <a:t>3/3/17</a:t>
+              <a:t>3/21/17</a:t>
             </a:fld>
             <a:endParaRPr lang="en-US" dirty="0"/>
           </a:p>
@@ -3303,7 +3518,7 @@
             <a:fld id="{B61BEF0D-F0BB-DE4B-95CE-6DB70DBA9567}" type="datetimeFigureOut">
               <a:rPr lang="en-US" dirty="0"/>
               <a:pPr/>
-              <a:t>3/3/17</a:t>
+              <a:t>3/21/17</a:t>
             </a:fld>
             <a:endParaRPr lang="en-US" dirty="0"/>
           </a:p>
@@ -3562,7 +3777,7 @@
             <a:fld id="{B61BEF0D-F0BB-DE4B-95CE-6DB70DBA9567}" type="datetimeFigureOut">
               <a:rPr lang="en-US" dirty="0"/>
               <a:pPr/>
-              <a:t>3/3/17</a:t>
+              <a:t>3/21/17</a:t>
             </a:fld>
             <a:endParaRPr lang="en-US" dirty="0"/>
           </a:p>
@@ -3888,7 +4103,7 @@
             <a:fld id="{B61BEF0D-F0BB-DE4B-95CE-6DB70DBA9567}" type="datetimeFigureOut">
               <a:rPr lang="en-US" dirty="0"/>
               <a:pPr/>
-              <a:t>3/3/17</a:t>
+              <a:t>3/21/17</a:t>
             </a:fld>
             <a:endParaRPr lang="en-US" dirty="0"/>
           </a:p>
@@ -4208,7 +4423,7 @@
             <a:fld id="{B61BEF0D-F0BB-DE4B-95CE-6DB70DBA9567}" type="datetimeFigureOut">
               <a:rPr lang="en-US" dirty="0"/>
               <a:pPr/>
-              <a:t>3/3/17</a:t>
+              <a:t>3/21/17</a:t>
             </a:fld>
             <a:endParaRPr lang="en-US" dirty="0"/>
           </a:p>
@@ -4662,7 +4877,7 @@
             <a:fld id="{B61BEF0D-F0BB-DE4B-95CE-6DB70DBA9567}" type="datetimeFigureOut">
               <a:rPr lang="en-US" dirty="0"/>
               <a:pPr/>
-              <a:t>3/3/17</a:t>
+              <a:t>3/21/17</a:t>
             </a:fld>
             <a:endParaRPr lang="en-US" dirty="0"/>
           </a:p>
@@ -4864,7 +5079,7 @@
             <a:fld id="{B61BEF0D-F0BB-DE4B-95CE-6DB70DBA9567}" type="datetimeFigureOut">
               <a:rPr lang="en-US" dirty="0"/>
               <a:pPr/>
-              <a:t>3/3/17</a:t>
+              <a:t>3/21/17</a:t>
             </a:fld>
             <a:endParaRPr lang="en-US" dirty="0"/>
           </a:p>
@@ -5038,7 +5253,7 @@
             <a:fld id="{B61BEF0D-F0BB-DE4B-95CE-6DB70DBA9567}" type="datetimeFigureOut">
               <a:rPr lang="en-US" dirty="0"/>
               <a:pPr/>
-              <a:t>3/3/17</a:t>
+              <a:t>3/21/17</a:t>
             </a:fld>
             <a:endParaRPr lang="en-US" dirty="0"/>
           </a:p>
@@ -5368,7 +5583,7 @@
             <a:fld id="{B61BEF0D-F0BB-DE4B-95CE-6DB70DBA9567}" type="datetimeFigureOut">
               <a:rPr lang="en-US" dirty="0"/>
               <a:pPr/>
-              <a:t>3/3/17</a:t>
+              <a:t>3/21/17</a:t>
             </a:fld>
             <a:endParaRPr lang="en-US" dirty="0"/>
           </a:p>
@@ -5710,7 +5925,7 @@
             <a:fld id="{B61BEF0D-F0BB-DE4B-95CE-6DB70DBA9567}" type="datetimeFigureOut">
               <a:rPr lang="en-US" dirty="0"/>
               <a:pPr/>
-              <a:t>3/3/17</a:t>
+              <a:t>3/21/17</a:t>
             </a:fld>
             <a:endParaRPr lang="en-US" dirty="0"/>
           </a:p>
@@ -7824,7 +8039,7 @@
             <a:fld id="{B61BEF0D-F0BB-DE4B-95CE-6DB70DBA9567}" type="datetimeFigureOut">
               <a:rPr lang="en-US" dirty="0"/>
               <a:pPr/>
-              <a:t>3/3/17</a:t>
+              <a:t>3/21/17</a:t>
             </a:fld>
             <a:endParaRPr lang="en-US" dirty="0"/>
           </a:p>
@@ -8350,8 +8565,8 @@
         </p:nvSpPr>
         <p:spPr>
           <a:xfrm>
-            <a:off x="2494166" y="1516157"/>
-            <a:ext cx="9386478" cy="2262781"/>
+            <a:off x="1884218" y="1516157"/>
+            <a:ext cx="9996426" cy="2262781"/>
           </a:xfrm>
         </p:spPr>
         <p:txBody>
@@ -8363,59 +8578,7 @@
             <a:pPr algn="ctr"/>
             <a:r>
               <a:rPr lang="en-US" altLang="zh-CN" sz="4400" dirty="0" smtClean="0"/>
-              <a:t>Predicting</a:t>
-            </a:r>
-            <a:r>
-              <a:rPr lang="zh-CN" altLang="en-US" sz="4400" dirty="0" smtClean="0"/>
-              <a:t> </a:t>
-            </a:r>
-            <a:r>
-              <a:rPr lang="en-US" altLang="zh-CN" sz="4400" dirty="0" smtClean="0"/>
-              <a:t>Online</a:t>
-            </a:r>
-            <a:r>
-              <a:rPr lang="zh-CN" altLang="en-US" sz="4400" dirty="0" smtClean="0"/>
-              <a:t> </a:t>
-            </a:r>
-            <a:r>
-              <a:rPr lang="en-US" altLang="zh-CN" sz="4400" dirty="0" smtClean="0"/>
-              <a:t>News</a:t>
-            </a:r>
-            <a:r>
-              <a:rPr lang="zh-CN" altLang="en-US" sz="4400" dirty="0" smtClean="0"/>
-              <a:t> </a:t>
-            </a:r>
-            <a:r>
-              <a:rPr lang="en-US" altLang="zh-CN" sz="4400" dirty="0" smtClean="0"/>
-              <a:t>Popularity:</a:t>
-            </a:r>
-            <a:r>
-              <a:rPr lang="zh-CN" altLang="en-US" sz="4400" dirty="0" smtClean="0"/>
-              <a:t> </a:t>
-            </a:r>
-            <a:r>
-              <a:rPr lang="en-US" altLang="zh-CN" sz="4400" dirty="0" smtClean="0"/>
-              <a:t>Classification</a:t>
-            </a:r>
-            <a:r>
-              <a:rPr lang="zh-CN" altLang="en-US" sz="4400" dirty="0" smtClean="0"/>
-              <a:t> </a:t>
-            </a:r>
-            <a:r>
-              <a:rPr lang="en-US" altLang="zh-CN" sz="4400" dirty="0" smtClean="0"/>
-              <a:t>and</a:t>
-            </a:r>
-            <a:r>
-              <a:rPr lang="zh-CN" altLang="en-US" sz="4400" dirty="0" smtClean="0"/>
-              <a:t> </a:t>
-            </a:r>
-            <a:r>
-              <a:rPr lang="en-US" altLang="zh-CN" sz="4400" dirty="0" smtClean="0"/>
-              <a:t>Clustering</a:t>
-            </a:r>
-            <a:r>
-              <a:rPr lang="zh-CN" altLang="en-US" sz="4400" dirty="0" smtClean="0"/>
-              <a:t> </a:t>
+              <a:t>Evading the Machine Learning Detector: A Virus’ Perspective</a:t>
             </a:r>
             <a:endParaRPr lang="en-US" sz="4400" dirty="0"/>
           </a:p>
@@ -10222,10 +10385,15 @@
             <p:ph idx="1"/>
           </p:nvPr>
         </p:nvSpPr>
-        <p:spPr/>
+        <p:spPr>
+          <a:xfrm>
+            <a:off x="1563976" y="4293064"/>
+            <a:ext cx="10628024" cy="3777622"/>
+          </a:xfrm>
+        </p:spPr>
         <p:txBody>
           <a:bodyPr>
-            <a:normAutofit fontScale="92500" lnSpcReduction="20000"/>
+            <a:normAutofit/>
           </a:bodyPr>
           <a:lstStyle/>
           <a:p>
@@ -10234,56 +10402,22 @@
           <a:p>
             <a:r>
               <a:rPr lang="en-US" altLang="zh-CN" sz="2800" dirty="0" smtClean="0"/>
-              <a:t>Predicting</a:t>
-            </a:r>
-            <a:r>
-              <a:rPr lang="zh-CN" altLang="en-US" sz="2800" dirty="0" smtClean="0"/>
-              <a:t> </a:t>
-            </a:r>
+              <a:t>How should a virus disguise itself to fool the detector?</a:t>
+            </a:r>
+          </a:p>
+          <a:p>
+            <a:endParaRPr lang="en-US" altLang="zh-CN" sz="2800" dirty="0"/>
+          </a:p>
+          <a:p>
             <a:r>
               <a:rPr lang="en-US" altLang="zh-CN" sz="2800" dirty="0" smtClean="0"/>
-              <a:t>online</a:t>
-            </a:r>
-            <a:r>
-              <a:rPr lang="zh-CN" altLang="en-US" sz="2800" dirty="0" smtClean="0"/>
-              <a:t> </a:t>
-            </a:r>
-            <a:r>
-              <a:rPr lang="en-US" altLang="zh-CN" sz="2800" dirty="0" smtClean="0"/>
-              <a:t>news</a:t>
-            </a:r>
-            <a:r>
-              <a:rPr lang="zh-CN" altLang="en-US" sz="2800" dirty="0" smtClean="0"/>
-              <a:t> </a:t>
-            </a:r>
-            <a:r>
-              <a:rPr lang="en-US" altLang="zh-CN" sz="2800" dirty="0" smtClean="0"/>
-              <a:t>popularity</a:t>
-            </a:r>
-            <a:r>
-              <a:rPr lang="zh-CN" altLang="en-US" sz="2800" dirty="0" smtClean="0"/>
-              <a:t> </a:t>
-            </a:r>
-            <a:r>
-              <a:rPr lang="en-US" altLang="zh-CN" sz="2800" dirty="0" smtClean="0"/>
-              <a:t>(no.</a:t>
-            </a:r>
-            <a:r>
-              <a:rPr lang="zh-CN" altLang="en-US" sz="2800" dirty="0" smtClean="0"/>
-              <a:t> </a:t>
-            </a:r>
-            <a:r>
-              <a:rPr lang="en-US" altLang="zh-CN" sz="2800" dirty="0" smtClean="0"/>
-              <a:t>of</a:t>
-            </a:r>
-            <a:r>
-              <a:rPr lang="zh-CN" altLang="en-US" sz="2800" dirty="0" smtClean="0"/>
-              <a:t> </a:t>
-            </a:r>
-            <a:r>
-              <a:rPr lang="en-US" altLang="zh-CN" sz="2800" dirty="0" smtClean="0"/>
-              <a:t>shares)</a:t>
-            </a:r>
+              <a:t>What are the important features of malicious executables?</a:t>
+            </a:r>
+          </a:p>
+          <a:p>
+            <a:endParaRPr lang="en-US" altLang="zh-CN" sz="2800" dirty="0"/>
+          </a:p>
+          <a:p>
             <a:endParaRPr lang="zh-CN" altLang="en-US" sz="2800" dirty="0" smtClean="0"/>
           </a:p>
           <a:p>
@@ -10293,134 +10427,6 @@
             <a:endParaRPr lang="zh-CN" altLang="en-US" sz="2800" dirty="0"/>
           </a:p>
           <a:p>
-            <a:r>
-              <a:rPr lang="en-US" altLang="zh-CN" sz="2800" dirty="0" smtClean="0"/>
-              <a:t>Traditional:</a:t>
-            </a:r>
-            <a:r>
-              <a:rPr lang="zh-CN" altLang="en-US" sz="2800" dirty="0" smtClean="0"/>
-              <a:t> </a:t>
-            </a:r>
-            <a:r>
-              <a:rPr lang="en-US" altLang="zh-CN" sz="2800" dirty="0" smtClean="0"/>
-              <a:t>Classification</a:t>
-            </a:r>
-            <a:r>
-              <a:rPr lang="zh-CN" altLang="en-US" sz="2800" dirty="0" smtClean="0"/>
-              <a:t> </a:t>
-            </a:r>
-            <a:r>
-              <a:rPr lang="en-US" altLang="zh-CN" sz="2800" dirty="0" smtClean="0"/>
-              <a:t>(SVM,</a:t>
-            </a:r>
-            <a:r>
-              <a:rPr lang="zh-CN" altLang="en-US" sz="2800" dirty="0" smtClean="0"/>
-              <a:t> </a:t>
-            </a:r>
-            <a:r>
-              <a:rPr lang="en-US" altLang="zh-CN" sz="2800" dirty="0" err="1" smtClean="0"/>
-              <a:t>kNN</a:t>
-            </a:r>
-            <a:r>
-              <a:rPr lang="en-US" altLang="zh-CN" sz="2800" dirty="0" smtClean="0"/>
-              <a:t>,</a:t>
-            </a:r>
-            <a:r>
-              <a:rPr lang="zh-CN" altLang="en-US" sz="2800" dirty="0" smtClean="0"/>
-              <a:t> </a:t>
-            </a:r>
-            <a:r>
-              <a:rPr lang="en-US" altLang="zh-CN" sz="2800" dirty="0" smtClean="0"/>
-              <a:t>etc.)</a:t>
-            </a:r>
-            <a:endParaRPr lang="zh-CN" altLang="en-US" sz="2800" dirty="0">
-              <a:sym typeface="Wingdings"/>
-            </a:endParaRPr>
-          </a:p>
-          <a:p>
-            <a:endParaRPr lang="zh-CN" altLang="en-US" sz="2800" dirty="0" smtClean="0">
-              <a:sym typeface="Wingdings"/>
-            </a:endParaRPr>
-          </a:p>
-          <a:p>
-            <a:r>
-              <a:rPr lang="en-US" altLang="zh-CN" sz="2800" dirty="0" smtClean="0">
-                <a:sym typeface="Wingdings"/>
-              </a:rPr>
-              <a:t>New:</a:t>
-            </a:r>
-            <a:r>
-              <a:rPr lang="zh-CN" altLang="en-US" sz="2800" dirty="0" smtClean="0">
-                <a:sym typeface="Wingdings"/>
-              </a:rPr>
-              <a:t> </a:t>
-            </a:r>
-            <a:r>
-              <a:rPr lang="en-US" altLang="zh-CN" sz="2800" dirty="0" smtClean="0">
-                <a:sym typeface="Wingdings"/>
-              </a:rPr>
-              <a:t>Clustering</a:t>
-            </a:r>
-            <a:r>
-              <a:rPr lang="zh-CN" altLang="en-US" sz="2800" dirty="0" smtClean="0">
-                <a:sym typeface="Wingdings"/>
-              </a:rPr>
-              <a:t> </a:t>
-            </a:r>
-            <a:r>
-              <a:rPr lang="en-US" altLang="zh-CN" sz="2800" dirty="0" smtClean="0">
-                <a:sym typeface="Wingdings"/>
-              </a:rPr>
-              <a:t>(K-means,</a:t>
-            </a:r>
-            <a:r>
-              <a:rPr lang="zh-CN" altLang="en-US" sz="2800" dirty="0" smtClean="0">
-                <a:sym typeface="Wingdings"/>
-              </a:rPr>
-              <a:t> </a:t>
-            </a:r>
-            <a:r>
-              <a:rPr lang="en-US" altLang="zh-CN" sz="2800" dirty="0" smtClean="0">
-                <a:sym typeface="Wingdings"/>
-              </a:rPr>
-              <a:t>EM,</a:t>
-            </a:r>
-            <a:r>
-              <a:rPr lang="zh-CN" altLang="en-US" sz="2800" dirty="0" smtClean="0">
-                <a:sym typeface="Wingdings"/>
-              </a:rPr>
-              <a:t> </a:t>
-            </a:r>
-            <a:r>
-              <a:rPr lang="en-US" altLang="zh-CN" sz="2800" dirty="0" smtClean="0">
-                <a:sym typeface="Wingdings"/>
-              </a:rPr>
-              <a:t>etc</a:t>
-            </a:r>
-            <a:r>
-              <a:rPr lang="en-US" altLang="zh-CN" sz="2800" dirty="0" smtClean="0">
-                <a:sym typeface="Wingdings"/>
-              </a:rPr>
-              <a:t>.)</a:t>
-            </a:r>
-          </a:p>
-          <a:p>
-            <a:endParaRPr lang="en-US" altLang="zh-CN" sz="2800" dirty="0">
-              <a:sym typeface="Wingdings"/>
-            </a:endParaRPr>
-          </a:p>
-          <a:p>
-            <a:r>
-              <a:rPr lang="en-US" altLang="zh-CN" sz="2800" dirty="0" smtClean="0">
-                <a:sym typeface="Wingdings"/>
-              </a:rPr>
-              <a:t>How to become a top hit?</a:t>
-            </a:r>
-            <a:endParaRPr lang="zh-CN" altLang="en-US" sz="2800" dirty="0" smtClean="0">
-              <a:sym typeface="Wingdings"/>
-            </a:endParaRPr>
-          </a:p>
-          <a:p>
             <a:endParaRPr lang="zh-CN" altLang="en-US" sz="2800" dirty="0">
               <a:sym typeface="Wingdings"/>
             </a:endParaRPr>
@@ -10433,6 +10439,36 @@
           </a:p>
         </p:txBody>
       </p:sp>
+      <p:pic>
+        <p:nvPicPr>
+          <p:cNvPr id="4" name="Picture 3"/>
+          <p:cNvPicPr>
+            <a:picLocks noChangeAspect="1"/>
+          </p:cNvPicPr>
+          <p:nvPr/>
+        </p:nvPicPr>
+        <p:blipFill>
+          <a:blip r:embed="rId3">
+            <a:extLst>
+              <a:ext uri="{28A0092B-C50C-407E-A947-70E740481C1C}">
+                <a14:useLocalDpi xmlns:a14="http://schemas.microsoft.com/office/drawing/2010/main" val="0"/>
+              </a:ext>
+            </a:extLst>
+          </a:blip>
+          <a:stretch>
+            <a:fillRect/>
+          </a:stretch>
+        </p:blipFill>
+        <p:spPr>
+          <a:xfrm>
+            <a:off x="3768705" y="1497637"/>
+            <a:ext cx="6002824" cy="3241169"/>
+          </a:xfrm>
+          <a:prstGeom prst="rect">
+            <a:avLst/>
+          </a:prstGeom>
+        </p:spPr>
+      </p:pic>
     </p:spTree>
     <p:extLst>
       <p:ext uri="{BB962C8B-B14F-4D97-AF65-F5344CB8AC3E}">
@@ -10446,9 +10482,210 @@
   <p:timing>
     <p:tnLst>
       <p:par>
-        <p:cTn id="1" dur="indefinite" restart="never" nodeType="tmRoot"/>
+        <p:cTn id="1" dur="indefinite" restart="never" nodeType="tmRoot">
+          <p:childTnLst>
+            <p:seq concurrent="1" nextAc="seek">
+              <p:cTn id="2" dur="indefinite" nodeType="mainSeq">
+                <p:childTnLst>
+                  <p:par>
+                    <p:cTn id="3" fill="hold">
+                      <p:stCondLst>
+                        <p:cond delay="indefinite"/>
+                      </p:stCondLst>
+                      <p:childTnLst>
+                        <p:par>
+                          <p:cTn id="4" fill="hold">
+                            <p:stCondLst>
+                              <p:cond delay="0"/>
+                            </p:stCondLst>
+                            <p:childTnLst>
+                              <p:par>
+                                <p:cTn id="5" presetID="9" presetClass="entr" presetSubtype="0" fill="hold" nodeType="clickEffect">
+                                  <p:stCondLst>
+                                    <p:cond delay="0"/>
+                                  </p:stCondLst>
+                                  <p:childTnLst>
+                                    <p:set>
+                                      <p:cBhvr>
+                                        <p:cTn id="6" dur="1" fill="hold">
+                                          <p:stCondLst>
+                                            <p:cond delay="0"/>
+                                          </p:stCondLst>
+                                        </p:cTn>
+                                        <p:tgtEl>
+                                          <p:spTgt spid="4"/>
+                                        </p:tgtEl>
+                                        <p:attrNameLst>
+                                          <p:attrName>style.visibility</p:attrName>
+                                        </p:attrNameLst>
+                                      </p:cBhvr>
+                                      <p:to>
+                                        <p:strVal val="visible"/>
+                                      </p:to>
+                                    </p:set>
+                                    <p:animEffect transition="in" filter="dissolve">
+                                      <p:cBhvr>
+                                        <p:cTn id="7" dur="500"/>
+                                        <p:tgtEl>
+                                          <p:spTgt spid="4"/>
+                                        </p:tgtEl>
+                                      </p:cBhvr>
+                                    </p:animEffect>
+                                  </p:childTnLst>
+                                </p:cTn>
+                              </p:par>
+                            </p:childTnLst>
+                          </p:cTn>
+                        </p:par>
+                      </p:childTnLst>
+                    </p:cTn>
+                  </p:par>
+                  <p:par>
+                    <p:cTn id="8" fill="hold">
+                      <p:stCondLst>
+                        <p:cond delay="indefinite"/>
+                      </p:stCondLst>
+                      <p:childTnLst>
+                        <p:par>
+                          <p:cTn id="9" fill="hold">
+                            <p:stCondLst>
+                              <p:cond delay="0"/>
+                            </p:stCondLst>
+                            <p:childTnLst>
+                              <p:par>
+                                <p:cTn id="10" presetID="5" presetClass="entr" presetSubtype="10" fill="hold" grpId="0" nodeType="clickEffect">
+                                  <p:stCondLst>
+                                    <p:cond delay="0"/>
+                                  </p:stCondLst>
+                                  <p:childTnLst>
+                                    <p:set>
+                                      <p:cBhvr>
+                                        <p:cTn id="11" dur="1" fill="hold">
+                                          <p:stCondLst>
+                                            <p:cond delay="0"/>
+                                          </p:stCondLst>
+                                        </p:cTn>
+                                        <p:tgtEl>
+                                          <p:spTgt spid="3">
+                                            <p:txEl>
+                                              <p:pRg st="1" end="1"/>
+                                            </p:txEl>
+                                          </p:spTgt>
+                                        </p:tgtEl>
+                                        <p:attrNameLst>
+                                          <p:attrName>style.visibility</p:attrName>
+                                        </p:attrNameLst>
+                                      </p:cBhvr>
+                                      <p:to>
+                                        <p:strVal val="visible"/>
+                                      </p:to>
+                                    </p:set>
+                                    <p:animEffect transition="in" filter="checkerboard(across)">
+                                      <p:cBhvr>
+                                        <p:cTn id="12" dur="500"/>
+                                        <p:tgtEl>
+                                          <p:spTgt spid="3">
+                                            <p:txEl>
+                                              <p:pRg st="1" end="1"/>
+                                            </p:txEl>
+                                          </p:spTgt>
+                                        </p:tgtEl>
+                                      </p:cBhvr>
+                                    </p:animEffect>
+                                  </p:childTnLst>
+                                </p:cTn>
+                              </p:par>
+                            </p:childTnLst>
+                          </p:cTn>
+                        </p:par>
+                      </p:childTnLst>
+                    </p:cTn>
+                  </p:par>
+                  <p:par>
+                    <p:cTn id="13" fill="hold">
+                      <p:stCondLst>
+                        <p:cond delay="indefinite"/>
+                      </p:stCondLst>
+                      <p:childTnLst>
+                        <p:par>
+                          <p:cTn id="14" fill="hold">
+                            <p:stCondLst>
+                              <p:cond delay="0"/>
+                            </p:stCondLst>
+                            <p:childTnLst>
+                              <p:par>
+                                <p:cTn id="15" presetID="5" presetClass="entr" presetSubtype="10" fill="hold" grpId="0" nodeType="clickEffect">
+                                  <p:stCondLst>
+                                    <p:cond delay="0"/>
+                                  </p:stCondLst>
+                                  <p:childTnLst>
+                                    <p:set>
+                                      <p:cBhvr>
+                                        <p:cTn id="16" dur="1" fill="hold">
+                                          <p:stCondLst>
+                                            <p:cond delay="0"/>
+                                          </p:stCondLst>
+                                        </p:cTn>
+                                        <p:tgtEl>
+                                          <p:spTgt spid="3">
+                                            <p:txEl>
+                                              <p:pRg st="3" end="3"/>
+                                            </p:txEl>
+                                          </p:spTgt>
+                                        </p:tgtEl>
+                                        <p:attrNameLst>
+                                          <p:attrName>style.visibility</p:attrName>
+                                        </p:attrNameLst>
+                                      </p:cBhvr>
+                                      <p:to>
+                                        <p:strVal val="visible"/>
+                                      </p:to>
+                                    </p:set>
+                                    <p:animEffect transition="in" filter="checkerboard(across)">
+                                      <p:cBhvr>
+                                        <p:cTn id="17" dur="500"/>
+                                        <p:tgtEl>
+                                          <p:spTgt spid="3">
+                                            <p:txEl>
+                                              <p:pRg st="3" end="3"/>
+                                            </p:txEl>
+                                          </p:spTgt>
+                                        </p:tgtEl>
+                                      </p:cBhvr>
+                                    </p:animEffect>
+                                  </p:childTnLst>
+                                </p:cTn>
+                              </p:par>
+                            </p:childTnLst>
+                          </p:cTn>
+                        </p:par>
+                      </p:childTnLst>
+                    </p:cTn>
+                  </p:par>
+                </p:childTnLst>
+              </p:cTn>
+              <p:prevCondLst>
+                <p:cond evt="onPrev" delay="0">
+                  <p:tgtEl>
+                    <p:sldTgt/>
+                  </p:tgtEl>
+                </p:cond>
+              </p:prevCondLst>
+              <p:nextCondLst>
+                <p:cond evt="onNext" delay="0">
+                  <p:tgtEl>
+                    <p:sldTgt/>
+                  </p:tgtEl>
+                </p:cond>
+              </p:nextCondLst>
+            </p:seq>
+          </p:childTnLst>
+        </p:cTn>
       </p:par>
     </p:tnLst>
+    <p:bldLst>
+      <p:bldP spid="3" grpId="0" build="p"/>
+    </p:bldLst>
   </p:timing>
 </p:sld>
 </file>
@@ -10488,20 +10725,12 @@
           <a:lstStyle/>
           <a:p>
             <a:r>
-              <a:rPr lang="en-US" sz="4400" dirty="0"/>
-              <a:t>Online News </a:t>
-            </a:r>
-            <a:r>
               <a:rPr lang="en-US" sz="4400" dirty="0" smtClean="0"/>
-              <a:t>Popularity</a:t>
-            </a:r>
-            <a:r>
-              <a:rPr lang="zh-CN" altLang="en-US" sz="4400" dirty="0" smtClean="0"/>
-              <a:t> </a:t>
+              <a:t>Malicious Executable</a:t>
             </a:r>
             <a:r>
               <a:rPr lang="en-US" sz="4400" dirty="0" smtClean="0"/>
-              <a:t>Dataset</a:t>
+              <a:t> Dataset</a:t>
             </a:r>
             <a:endParaRPr lang="en-US" sz="4400" dirty="0"/>
           </a:p>
@@ -10525,7 +10754,7 @@
         </p:spPr>
         <p:txBody>
           <a:bodyPr>
-            <a:normAutofit fontScale="92500"/>
+            <a:normAutofit/>
           </a:bodyPr>
           <a:lstStyle/>
           <a:p>
@@ -10539,89 +10768,85 @@
             </a:r>
             <a:r>
               <a:rPr lang="en-US" sz="2800" dirty="0"/>
-              <a:t>retrieved from UCI ML repository</a:t>
-            </a:r>
+              <a:t>retrieved from UCI ML </a:t>
+            </a:r>
+            <a:r>
+              <a:rPr lang="en-US" sz="2800" dirty="0" smtClean="0"/>
+              <a:t>repository</a:t>
+            </a:r>
+          </a:p>
+          <a:p>
+            <a:endParaRPr lang="en-US" sz="2800" dirty="0" smtClean="0"/>
+          </a:p>
+          <a:p>
+            <a:r>
+              <a:rPr lang="en-US" altLang="zh-CN" sz="2800" dirty="0"/>
+              <a:t>500 hex </a:t>
+            </a:r>
+            <a:r>
+              <a:rPr lang="en-US" altLang="zh-CN" sz="2800" dirty="0" smtClean="0"/>
+              <a:t>features, 13 </a:t>
+            </a:r>
+            <a:r>
+              <a:rPr lang="en-US" altLang="zh-CN" sz="2800" dirty="0"/>
+              <a:t>DLL </a:t>
+            </a:r>
+            <a:r>
+              <a:rPr lang="en-US" altLang="zh-CN" sz="2800" dirty="0" smtClean="0"/>
+              <a:t>features</a:t>
+            </a:r>
+            <a:endParaRPr lang="en-US" sz="2800" dirty="0" smtClean="0"/>
+          </a:p>
+          <a:p>
+            <a:endParaRPr lang="en-US" sz="2800" dirty="0"/>
+          </a:p>
+          <a:p>
+            <a:endParaRPr lang="en-US" sz="2800" dirty="0"/>
           </a:p>
           <a:p>
             <a:endParaRPr lang="zh-CN" altLang="en-US" sz="2800" dirty="0" smtClean="0"/>
           </a:p>
           <a:p>
-            <a:r>
-              <a:rPr lang="en-US" altLang="zh-CN" sz="2800" dirty="0" smtClean="0"/>
-              <a:t>Number </a:t>
-            </a:r>
-            <a:r>
-              <a:rPr lang="en-US" altLang="zh-CN" sz="2800" dirty="0"/>
-              <a:t>of instances: </a:t>
-            </a:r>
-            <a:r>
-              <a:rPr lang="fi-FI" sz="2800" dirty="0"/>
-              <a:t>39797</a:t>
-            </a:r>
-            <a:endParaRPr lang="en-US" altLang="zh-CN" sz="2800" dirty="0"/>
-          </a:p>
-          <a:p>
             <a:endParaRPr lang="en-US" sz="2800" dirty="0"/>
           </a:p>
           <a:p>
-            <a:r>
-              <a:rPr lang="en-US" sz="2800" dirty="0"/>
-              <a:t>Number of attributes: 61 (58 predictive attributes, </a:t>
-            </a:r>
-            <a:endParaRPr lang="zh-CN" altLang="en-US" sz="2800" dirty="0" smtClean="0"/>
-          </a:p>
-          <a:p>
-            <a:pPr marL="0" indent="0">
-              <a:buNone/>
-            </a:pPr>
-            <a:r>
-              <a:rPr lang="zh-CN" altLang="en-US" sz="2800" dirty="0"/>
-              <a:t>	</a:t>
-            </a:r>
-            <a:r>
-              <a:rPr lang="zh-CN" altLang="en-US" sz="2800" dirty="0" smtClean="0"/>
-              <a:t>							  </a:t>
-            </a:r>
-            <a:r>
-              <a:rPr lang="en-US" sz="2800" dirty="0" smtClean="0"/>
-              <a:t>2 </a:t>
-            </a:r>
-            <a:r>
-              <a:rPr lang="en-US" sz="2800" dirty="0"/>
-              <a:t>non-predictive, 1 goal field) </a:t>
-            </a:r>
+            <a:endParaRPr lang="en-US" sz="2800" dirty="0" smtClean="0"/>
           </a:p>
           <a:p>
             <a:endParaRPr lang="en-US" sz="2800" dirty="0"/>
           </a:p>
           <a:p>
-            <a:r>
-              <a:rPr lang="en-US" sz="2800" dirty="0"/>
-              <a:t>Attribute info: </a:t>
-            </a:r>
-            <a:r>
-              <a:rPr lang="en-US" altLang="zh-CN" sz="2800" dirty="0" smtClean="0"/>
-              <a:t>Integer/Real</a:t>
-            </a:r>
             <a:endParaRPr lang="en-US" sz="2800" dirty="0"/>
           </a:p>
           <a:p>
             <a:endParaRPr lang="en-US" sz="2800" dirty="0"/>
           </a:p>
-          <a:p>
-            <a:endParaRPr lang="en-US" sz="2800" dirty="0" smtClean="0"/>
-          </a:p>
-          <a:p>
-            <a:endParaRPr lang="en-US" sz="2800" dirty="0"/>
-          </a:p>
-          <a:p>
-            <a:endParaRPr lang="en-US" sz="2800" dirty="0"/>
-          </a:p>
-          <a:p>
-            <a:endParaRPr lang="en-US" sz="2800" dirty="0"/>
-          </a:p>
-        </p:txBody>
-      </p:sp>
+        </p:txBody>
+      </p:sp>
+      <p:pic>
+        <p:nvPicPr>
+          <p:cNvPr id="5" name="Picture 4"/>
+          <p:cNvPicPr>
+            <a:picLocks noChangeAspect="1"/>
+          </p:cNvPicPr>
+          <p:nvPr/>
+        </p:nvPicPr>
+        <p:blipFill>
+          <a:blip r:embed="rId3"/>
+          <a:stretch>
+            <a:fillRect/>
+          </a:stretch>
+        </p:blipFill>
+        <p:spPr>
+          <a:xfrm>
+            <a:off x="2427847" y="4512496"/>
+            <a:ext cx="9764153" cy="1411193"/>
+          </a:xfrm>
+          <a:prstGeom prst="rect">
+            <a:avLst/>
+          </a:prstGeom>
+        </p:spPr>
+      </p:pic>
     </p:spTree>
     <p:extLst>
       <p:ext uri="{BB962C8B-B14F-4D97-AF65-F5344CB8AC3E}">
@@ -10788,11 +11013,7 @@
                                           </p:stCondLst>
                                         </p:cTn>
                                         <p:tgtEl>
-                                          <p:spTgt spid="3">
-                                            <p:txEl>
-                                              <p:pRg st="4" end="4"/>
-                                            </p:txEl>
-                                          </p:spTgt>
+                                          <p:spTgt spid="5"/>
                                         </p:tgtEl>
                                         <p:attrNameLst>
                                           <p:attrName>style.visibility</p:attrName>
@@ -10806,133 +11027,7 @@
                                       <p:cBhvr>
                                         <p:cTn id="17" dur="500"/>
                                         <p:tgtEl>
-                                          <p:spTgt spid="3">
-                                            <p:txEl>
-                                              <p:pRg st="4" end="4"/>
-                                            </p:txEl>
-                                          </p:spTgt>
-                                        </p:tgtEl>
-                                      </p:cBhvr>
-                                    </p:animEffect>
-                                  </p:childTnLst>
-                                </p:cTn>
-                              </p:par>
-                            </p:childTnLst>
-                          </p:cTn>
-                        </p:par>
-                      </p:childTnLst>
-                    </p:cTn>
-                  </p:par>
-                  <p:par>
-                    <p:cTn id="18" fill="hold">
-                      <p:stCondLst>
-                        <p:cond delay="indefinite"/>
-                      </p:stCondLst>
-                      <p:childTnLst>
-                        <p:par>
-                          <p:cTn id="19" fill="hold">
-                            <p:stCondLst>
-                              <p:cond delay="0"/>
-                            </p:stCondLst>
-                            <p:childTnLst>
-                              <p:par>
-                                <p:cTn id="20" presetID="9" presetClass="entr" presetSubtype="0" fill="hold" nodeType="clickEffect">
-                                  <p:stCondLst>
-                                    <p:cond delay="0"/>
-                                  </p:stCondLst>
-                                  <p:childTnLst>
-                                    <p:set>
-                                      <p:cBhvr>
-                                        <p:cTn id="21" dur="1" fill="hold">
-                                          <p:stCondLst>
-                                            <p:cond delay="0"/>
-                                          </p:stCondLst>
-                                        </p:cTn>
-                                        <p:tgtEl>
-                                          <p:spTgt spid="3">
-                                            <p:txEl>
-                                              <p:pRg st="5" end="5"/>
-                                            </p:txEl>
-                                          </p:spTgt>
-                                        </p:tgtEl>
-                                        <p:attrNameLst>
-                                          <p:attrName>style.visibility</p:attrName>
-                                        </p:attrNameLst>
-                                      </p:cBhvr>
-                                      <p:to>
-                                        <p:strVal val="visible"/>
-                                      </p:to>
-                                    </p:set>
-                                    <p:animEffect transition="in" filter="dissolve">
-                                      <p:cBhvr>
-                                        <p:cTn id="22" dur="500"/>
-                                        <p:tgtEl>
-                                          <p:spTgt spid="3">
-                                            <p:txEl>
-                                              <p:pRg st="5" end="5"/>
-                                            </p:txEl>
-                                          </p:spTgt>
-                                        </p:tgtEl>
-                                      </p:cBhvr>
-                                    </p:animEffect>
-                                  </p:childTnLst>
-                                </p:cTn>
-                              </p:par>
-                            </p:childTnLst>
-                          </p:cTn>
-                        </p:par>
-                      </p:childTnLst>
-                    </p:cTn>
-                  </p:par>
-                  <p:par>
-                    <p:cTn id="23" fill="hold">
-                      <p:stCondLst>
-                        <p:cond delay="indefinite"/>
-                      </p:stCondLst>
-                      <p:childTnLst>
-                        <p:par>
-                          <p:cTn id="24" fill="hold">
-                            <p:stCondLst>
-                              <p:cond delay="0"/>
-                            </p:stCondLst>
-                            <p:childTnLst>
-                              <p:par>
-                                <p:cTn id="25" presetID="9" presetClass="entr" presetSubtype="0" fill="hold" nodeType="clickEffect">
-                                  <p:stCondLst>
-                                    <p:cond delay="0"/>
-                                  </p:stCondLst>
-                                  <p:childTnLst>
-                                    <p:set>
-                                      <p:cBhvr>
-                                        <p:cTn id="26" dur="1" fill="hold">
-                                          <p:stCondLst>
-                                            <p:cond delay="0"/>
-                                          </p:stCondLst>
-                                        </p:cTn>
-                                        <p:tgtEl>
-                                          <p:spTgt spid="3">
-                                            <p:txEl>
-                                              <p:pRg st="7" end="7"/>
-                                            </p:txEl>
-                                          </p:spTgt>
-                                        </p:tgtEl>
-                                        <p:attrNameLst>
-                                          <p:attrName>style.visibility</p:attrName>
-                                        </p:attrNameLst>
-                                      </p:cBhvr>
-                                      <p:to>
-                                        <p:strVal val="visible"/>
-                                      </p:to>
-                                    </p:set>
-                                    <p:animEffect transition="in" filter="dissolve">
-                                      <p:cBhvr>
-                                        <p:cTn id="27" dur="500"/>
-                                        <p:tgtEl>
-                                          <p:spTgt spid="3">
-                                            <p:txEl>
-                                              <p:pRg st="7" end="7"/>
-                                            </p:txEl>
-                                          </p:spTgt>
+                                          <p:spTgt spid="5"/>
                                         </p:tgtEl>
                                       </p:cBhvr>
                                     </p:animEffect>
@@ -11032,258 +11127,144 @@
         </p:nvSpPr>
         <p:spPr>
           <a:xfrm>
-            <a:off x="2589212" y="1270827"/>
+            <a:off x="2589212" y="1450121"/>
             <a:ext cx="8915400" cy="5587173"/>
           </a:xfrm>
         </p:spPr>
         <p:txBody>
           <a:bodyPr>
-            <a:normAutofit fontScale="55000" lnSpcReduction="20000"/>
+            <a:normAutofit/>
           </a:bodyPr>
           <a:lstStyle/>
+          <a:p>
+            <a:r>
+              <a:rPr lang="en-US" altLang="zh-CN" sz="2800" dirty="0" smtClean="0"/>
+              <a:t>N-gram Feature</a:t>
+            </a:r>
+          </a:p>
+          <a:p>
+            <a:pPr lvl="1"/>
+            <a:r>
+              <a:rPr lang="it-IT" sz="2800" dirty="0"/>
+              <a:t> </a:t>
+            </a:r>
+            <a:r>
+              <a:rPr lang="it-IT" sz="2800" dirty="0" smtClean="0"/>
+              <a:t>a1b2c3d4e5  </a:t>
+            </a:r>
+            <a:r>
+              <a:rPr lang="it-IT" sz="2800" dirty="0" smtClean="0">
+                <a:sym typeface="Wingdings"/>
+              </a:rPr>
+              <a:t> 4-gram: </a:t>
+            </a:r>
+            <a:r>
+              <a:rPr lang="it-IT" sz="2400" dirty="0" smtClean="0"/>
+              <a:t>a1b2c3d4 &amp; b2c3d4e5</a:t>
+            </a:r>
+          </a:p>
+          <a:p>
+            <a:pPr marL="457200" lvl="1" indent="0">
+              <a:buNone/>
+            </a:pPr>
+            <a:endParaRPr lang="zh-CN" altLang="en-US" sz="2600" dirty="0" smtClean="0"/>
+          </a:p>
+          <a:p>
+            <a:r>
+              <a:rPr lang="en-US" altLang="zh-CN" sz="2800" dirty="0" smtClean="0"/>
+              <a:t>Binary/Assembly/DLL N-gram Feature Set</a:t>
+            </a:r>
+          </a:p>
+          <a:p>
+            <a:endParaRPr lang="en-US" altLang="zh-CN" sz="2800" dirty="0"/>
+          </a:p>
+          <a:p>
+            <a:r>
+              <a:rPr lang="en-US" altLang="zh-CN" sz="2800" dirty="0" smtClean="0"/>
+              <a:t>Best 500 features for each set based on Gain</a:t>
+            </a:r>
+          </a:p>
           <a:p>
             <a:pPr marL="0" indent="0">
               <a:buNone/>
             </a:pPr>
-            <a:endParaRPr lang="zh-CN" altLang="en-US" sz="4700" dirty="0" smtClean="0"/>
-          </a:p>
-          <a:p>
-            <a:r>
-              <a:rPr lang="en-US" altLang="zh-CN" sz="4700" dirty="0"/>
-              <a:t>C</a:t>
-            </a:r>
-            <a:r>
-              <a:rPr lang="en-US" altLang="zh-CN" sz="4700" dirty="0" smtClean="0"/>
-              <a:t>reates</a:t>
-            </a:r>
-            <a:r>
-              <a:rPr lang="zh-CN" altLang="en-US" sz="4700" dirty="0" smtClean="0"/>
-              <a:t> </a:t>
-            </a:r>
-            <a:r>
-              <a:rPr lang="en-US" altLang="zh-CN" sz="4700" dirty="0" smtClean="0"/>
-              <a:t>the</a:t>
-            </a:r>
-            <a:r>
-              <a:rPr lang="zh-CN" altLang="en-US" sz="4700" dirty="0" smtClean="0"/>
-              <a:t> </a:t>
-            </a:r>
-            <a:r>
-              <a:rPr lang="en-US" altLang="zh-CN" sz="4700" dirty="0" smtClean="0"/>
-              <a:t>dataset</a:t>
-            </a:r>
-            <a:r>
-              <a:rPr lang="zh-CN" altLang="en-US" sz="4700" dirty="0" smtClean="0"/>
-              <a:t> </a:t>
-            </a:r>
-            <a:r>
-              <a:rPr lang="en-US" altLang="zh-CN" sz="4700" dirty="0" smtClean="0"/>
-              <a:t>(constructs</a:t>
-            </a:r>
-            <a:r>
-              <a:rPr lang="zh-CN" altLang="en-US" sz="4700" dirty="0" smtClean="0"/>
-              <a:t> </a:t>
-            </a:r>
-            <a:r>
-              <a:rPr lang="en-US" altLang="zh-CN" sz="4700" dirty="0" smtClean="0"/>
-              <a:t>all</a:t>
-            </a:r>
-            <a:r>
-              <a:rPr lang="zh-CN" altLang="en-US" sz="4700" dirty="0" smtClean="0"/>
-              <a:t> </a:t>
-            </a:r>
-            <a:r>
-              <a:rPr lang="en-US" altLang="zh-CN" sz="4700" dirty="0" smtClean="0"/>
-              <a:t>features)</a:t>
-            </a:r>
-            <a:endParaRPr lang="zh-CN" altLang="en-US" sz="4700" dirty="0" smtClean="0"/>
-          </a:p>
-          <a:p>
-            <a:endParaRPr lang="zh-CN" altLang="en-US" sz="4700" dirty="0"/>
-          </a:p>
-          <a:p>
-            <a:r>
-              <a:rPr lang="en-US" altLang="zh-CN" sz="4700" dirty="0" err="1"/>
-              <a:t>B</a:t>
-            </a:r>
-            <a:r>
-              <a:rPr lang="en-US" altLang="zh-CN" sz="4700" dirty="0" err="1" smtClean="0"/>
-              <a:t>inarizes</a:t>
-            </a:r>
-            <a:r>
-              <a:rPr lang="zh-CN" altLang="en-US" sz="4700" dirty="0" smtClean="0"/>
-              <a:t> </a:t>
-            </a:r>
-            <a:r>
-              <a:rPr lang="en-US" altLang="zh-CN" sz="4700" dirty="0" smtClean="0"/>
-              <a:t>the</a:t>
-            </a:r>
-            <a:r>
-              <a:rPr lang="zh-CN" altLang="en-US" sz="4700" dirty="0" smtClean="0"/>
-              <a:t> </a:t>
-            </a:r>
-            <a:r>
-              <a:rPr lang="en-US" altLang="zh-CN" sz="4700" dirty="0" smtClean="0"/>
-              <a:t>target</a:t>
-            </a:r>
-            <a:r>
-              <a:rPr lang="zh-CN" altLang="en-US" sz="4700" dirty="0" smtClean="0"/>
-              <a:t> </a:t>
-            </a:r>
-            <a:r>
-              <a:rPr lang="en-US" altLang="zh-CN" sz="4700" dirty="0" smtClean="0"/>
-              <a:t>value</a:t>
-            </a:r>
-            <a:r>
-              <a:rPr lang="zh-CN" altLang="en-US" sz="4700" dirty="0" smtClean="0"/>
-              <a:t> </a:t>
-            </a:r>
-            <a:r>
-              <a:rPr lang="en-US" altLang="zh-CN" sz="4700" dirty="0" smtClean="0"/>
-              <a:t>(threshold</a:t>
-            </a:r>
-            <a:r>
-              <a:rPr lang="zh-CN" altLang="en-US" sz="4700" dirty="0" smtClean="0"/>
-              <a:t> </a:t>
-            </a:r>
-            <a:r>
-              <a:rPr lang="en-US" altLang="zh-CN" sz="4700" dirty="0" smtClean="0"/>
-              <a:t>=</a:t>
-            </a:r>
-            <a:r>
-              <a:rPr lang="zh-CN" altLang="en-US" sz="4700" dirty="0" smtClean="0"/>
-              <a:t> </a:t>
-            </a:r>
-            <a:r>
-              <a:rPr lang="en-US" altLang="zh-CN" sz="4700" dirty="0" smtClean="0"/>
-              <a:t>1400)</a:t>
-            </a:r>
-            <a:endParaRPr lang="zh-CN" altLang="en-US" sz="4700" dirty="0" smtClean="0"/>
-          </a:p>
-          <a:p>
-            <a:endParaRPr lang="zh-CN" altLang="en-US" sz="4700" dirty="0" smtClean="0"/>
-          </a:p>
-          <a:p>
-            <a:r>
-              <a:rPr lang="en-US" altLang="zh-CN" sz="4700" dirty="0" smtClean="0"/>
-              <a:t>Algorithms:</a:t>
-            </a:r>
-            <a:r>
-              <a:rPr lang="zh-CN" altLang="en-US" sz="4700" dirty="0" smtClean="0"/>
-              <a:t> </a:t>
-            </a:r>
-            <a:r>
-              <a:rPr lang="en-US" altLang="zh-CN" sz="4700" dirty="0" smtClean="0"/>
-              <a:t>SVM/</a:t>
-            </a:r>
-            <a:r>
-              <a:rPr lang="en-US" altLang="zh-CN" sz="4700" dirty="0" err="1" smtClean="0"/>
-              <a:t>kNN</a:t>
-            </a:r>
-            <a:r>
-              <a:rPr lang="en-US" altLang="zh-CN" sz="4700" dirty="0" smtClean="0"/>
-              <a:t>/NB/</a:t>
-            </a:r>
-            <a:r>
-              <a:rPr lang="en-US" altLang="zh-CN" sz="4700" dirty="0" err="1" smtClean="0"/>
-              <a:t>AdaBoost</a:t>
-            </a:r>
-            <a:r>
-              <a:rPr lang="en-US" altLang="zh-CN" sz="4700" dirty="0" smtClean="0"/>
-              <a:t>/RF</a:t>
-            </a:r>
-            <a:endParaRPr lang="zh-CN" altLang="en-US" sz="4700" dirty="0"/>
-          </a:p>
-          <a:p>
-            <a:endParaRPr lang="zh-CN" altLang="en-US" sz="4700" dirty="0" smtClean="0"/>
-          </a:p>
-          <a:p>
-            <a:r>
-              <a:rPr lang="en-US" altLang="zh-CN" sz="4700" dirty="0"/>
-              <a:t>B</a:t>
-            </a:r>
-            <a:r>
-              <a:rPr lang="en-US" altLang="zh-CN" sz="4700" dirty="0" smtClean="0"/>
-              <a:t>est:</a:t>
-            </a:r>
-            <a:r>
-              <a:rPr lang="zh-CN" altLang="en-US" sz="4700" dirty="0" smtClean="0"/>
-              <a:t> </a:t>
-            </a:r>
-            <a:r>
-              <a:rPr lang="en-US" altLang="zh-CN" sz="4700" dirty="0" smtClean="0"/>
-              <a:t>Random</a:t>
-            </a:r>
-            <a:r>
-              <a:rPr lang="zh-CN" altLang="en-US" sz="4700" dirty="0" smtClean="0"/>
-              <a:t> </a:t>
-            </a:r>
-            <a:r>
-              <a:rPr lang="en-US" altLang="zh-CN" sz="4700" dirty="0" smtClean="0"/>
-              <a:t>Forest</a:t>
-            </a:r>
-            <a:r>
-              <a:rPr lang="zh-CN" altLang="en-US" sz="4700" dirty="0" smtClean="0"/>
-              <a:t> </a:t>
-            </a:r>
-            <a:r>
-              <a:rPr lang="en-US" altLang="zh-CN" sz="4700" dirty="0" smtClean="0"/>
-              <a:t>(AUC=0.73)</a:t>
-            </a:r>
-            <a:endParaRPr lang="zh-CN" altLang="en-US" sz="4700" dirty="0" smtClean="0"/>
-          </a:p>
-          <a:p>
-            <a:endParaRPr lang="zh-CN" altLang="en-US" sz="2800" dirty="0"/>
-          </a:p>
-          <a:p>
-            <a:endParaRPr lang="zh-CN" altLang="en-US" sz="2800" dirty="0" smtClean="0"/>
-          </a:p>
-          <a:p>
-            <a:endParaRPr lang="zh-CN" altLang="en-US" sz="2800" dirty="0" smtClean="0"/>
-          </a:p>
-          <a:p>
-            <a:r>
-              <a:rPr lang="en-US" sz="3300" dirty="0" smtClean="0"/>
-              <a:t>K</a:t>
-            </a:r>
-            <a:r>
-              <a:rPr lang="en-US" sz="3300" dirty="0"/>
-              <a:t>. </a:t>
-            </a:r>
-            <a:r>
-              <a:rPr lang="en-US" sz="3300" dirty="0" err="1"/>
-              <a:t>Fernandes</a:t>
-            </a:r>
-            <a:r>
-              <a:rPr lang="en-US" sz="3300" dirty="0"/>
-              <a:t>, P. </a:t>
-            </a:r>
-            <a:r>
-              <a:rPr lang="en-US" sz="3300" dirty="0" err="1"/>
-              <a:t>Vinagre</a:t>
-            </a:r>
-            <a:r>
-              <a:rPr lang="en-US" sz="3300" dirty="0"/>
-              <a:t> and P. Cortez. </a:t>
-            </a:r>
-            <a:r>
-              <a:rPr lang="en-US" sz="3300" b="1" dirty="0"/>
-              <a:t>A Proactive Intelligent Decision Support System for Predicting the Popularity of Online News</a:t>
-            </a:r>
-            <a:r>
-              <a:rPr lang="en-US" sz="3300" dirty="0"/>
-              <a:t>. Proceedings of the 17th EPIA 2015 - Portuguese Conference on Artificial Intelligence, September, Coimbra, Portugal.</a:t>
-            </a:r>
-            <a:endParaRPr lang="zh-CN" altLang="en-US" sz="3300" dirty="0"/>
+            <a:endParaRPr lang="en-US" altLang="zh-CN" sz="2800" dirty="0" smtClean="0"/>
           </a:p>
           <a:p>
             <a:pPr marL="0" indent="0">
               <a:buNone/>
             </a:pPr>
-            <a:endParaRPr lang="zh-CN" altLang="en-US" sz="3300" dirty="0" smtClean="0"/>
-          </a:p>
-        </p:txBody>
-      </p:sp>
+            <a:endParaRPr lang="zh-CN" altLang="en-US" sz="2800" dirty="0" smtClean="0"/>
+          </a:p>
+          <a:p>
+            <a:r>
+              <a:rPr lang="en-US" sz="1700" dirty="0" err="1"/>
+              <a:t>Masud</a:t>
+            </a:r>
+            <a:r>
+              <a:rPr lang="en-US" sz="1700" dirty="0"/>
+              <a:t>, Mohammad M., </a:t>
+            </a:r>
+            <a:r>
+              <a:rPr lang="en-US" sz="1700" dirty="0" err="1"/>
+              <a:t>Latifur</a:t>
+            </a:r>
+            <a:r>
+              <a:rPr lang="en-US" sz="1700" dirty="0"/>
+              <a:t> Khan, and </a:t>
+            </a:r>
+            <a:r>
+              <a:rPr lang="en-US" sz="1700" dirty="0" err="1"/>
+              <a:t>Bhavani</a:t>
+            </a:r>
+            <a:r>
+              <a:rPr lang="en-US" sz="1700" dirty="0"/>
+              <a:t> </a:t>
+            </a:r>
+            <a:r>
+              <a:rPr lang="en-US" sz="1700" dirty="0" err="1"/>
+              <a:t>Thuraisingham</a:t>
+            </a:r>
+            <a:r>
+              <a:rPr lang="en-US" sz="1700" dirty="0"/>
+              <a:t>. "</a:t>
+            </a:r>
+            <a:r>
+              <a:rPr lang="en-US" sz="1700" b="1" dirty="0"/>
+              <a:t>A hybrid model to detect malicious executables</a:t>
+            </a:r>
+            <a:r>
+              <a:rPr lang="en-US" sz="1700" dirty="0"/>
+              <a:t>." Communications, 2007. ICC'07. IEEE International Conference on. IEEE, 2007.</a:t>
+            </a:r>
+            <a:endParaRPr lang="zh-CN" altLang="en-US" sz="1700" dirty="0" smtClean="0"/>
+          </a:p>
+        </p:txBody>
+      </p:sp>
+      <p:pic>
+        <p:nvPicPr>
+          <p:cNvPr id="5" name="Picture 4"/>
+          <p:cNvPicPr>
+            <a:picLocks noChangeAspect="1"/>
+          </p:cNvPicPr>
+          <p:nvPr/>
+        </p:nvPicPr>
+        <p:blipFill>
+          <a:blip r:embed="rId3"/>
+          <a:stretch>
+            <a:fillRect/>
+          </a:stretch>
+        </p:blipFill>
+        <p:spPr>
+          <a:xfrm>
+            <a:off x="3675530" y="4830056"/>
+            <a:ext cx="6097868" cy="871124"/>
+          </a:xfrm>
+          <a:prstGeom prst="rect">
+            <a:avLst/>
+          </a:prstGeom>
+        </p:spPr>
+      </p:pic>
     </p:spTree>
     <p:extLst>
       <p:ext uri="{BB962C8B-B14F-4D97-AF65-F5344CB8AC3E}">
@@ -11297,9 +11278,375 @@
   <p:timing>
     <p:tnLst>
       <p:par>
-        <p:cTn id="1" dur="indefinite" restart="never" nodeType="tmRoot"/>
+        <p:cTn id="1" dur="indefinite" restart="never" nodeType="tmRoot">
+          <p:childTnLst>
+            <p:seq concurrent="1" nextAc="seek">
+              <p:cTn id="2" dur="indefinite" nodeType="mainSeq">
+                <p:childTnLst>
+                  <p:par>
+                    <p:cTn id="3" fill="hold">
+                      <p:stCondLst>
+                        <p:cond delay="indefinite"/>
+                      </p:stCondLst>
+                      <p:childTnLst>
+                        <p:par>
+                          <p:cTn id="4" fill="hold">
+                            <p:stCondLst>
+                              <p:cond delay="0"/>
+                            </p:stCondLst>
+                            <p:childTnLst>
+                              <p:par>
+                                <p:cTn id="5" presetID="9" presetClass="entr" presetSubtype="0" fill="hold" grpId="0" nodeType="clickEffect">
+                                  <p:stCondLst>
+                                    <p:cond delay="0"/>
+                                  </p:stCondLst>
+                                  <p:childTnLst>
+                                    <p:set>
+                                      <p:cBhvr>
+                                        <p:cTn id="6" dur="1" fill="hold">
+                                          <p:stCondLst>
+                                            <p:cond delay="0"/>
+                                          </p:stCondLst>
+                                        </p:cTn>
+                                        <p:tgtEl>
+                                          <p:spTgt spid="3">
+                                            <p:txEl>
+                                              <p:pRg st="0" end="0"/>
+                                            </p:txEl>
+                                          </p:spTgt>
+                                        </p:tgtEl>
+                                        <p:attrNameLst>
+                                          <p:attrName>style.visibility</p:attrName>
+                                        </p:attrNameLst>
+                                      </p:cBhvr>
+                                      <p:to>
+                                        <p:strVal val="visible"/>
+                                      </p:to>
+                                    </p:set>
+                                    <p:animEffect transition="in" filter="dissolve">
+                                      <p:cBhvr>
+                                        <p:cTn id="7" dur="500"/>
+                                        <p:tgtEl>
+                                          <p:spTgt spid="3">
+                                            <p:txEl>
+                                              <p:pRg st="0" end="0"/>
+                                            </p:txEl>
+                                          </p:spTgt>
+                                        </p:tgtEl>
+                                      </p:cBhvr>
+                                    </p:animEffect>
+                                  </p:childTnLst>
+                                </p:cTn>
+                              </p:par>
+                              <p:par>
+                                <p:cTn id="8" presetID="9" presetClass="entr" presetSubtype="0" fill="hold" grpId="0" nodeType="withEffect">
+                                  <p:stCondLst>
+                                    <p:cond delay="0"/>
+                                  </p:stCondLst>
+                                  <p:childTnLst>
+                                    <p:set>
+                                      <p:cBhvr>
+                                        <p:cTn id="9" dur="1" fill="hold">
+                                          <p:stCondLst>
+                                            <p:cond delay="0"/>
+                                          </p:stCondLst>
+                                        </p:cTn>
+                                        <p:tgtEl>
+                                          <p:spTgt spid="3">
+                                            <p:txEl>
+                                              <p:pRg st="1" end="1"/>
+                                            </p:txEl>
+                                          </p:spTgt>
+                                        </p:tgtEl>
+                                        <p:attrNameLst>
+                                          <p:attrName>style.visibility</p:attrName>
+                                        </p:attrNameLst>
+                                      </p:cBhvr>
+                                      <p:to>
+                                        <p:strVal val="visible"/>
+                                      </p:to>
+                                    </p:set>
+                                    <p:animEffect transition="in" filter="dissolve">
+                                      <p:cBhvr>
+                                        <p:cTn id="10" dur="500"/>
+                                        <p:tgtEl>
+                                          <p:spTgt spid="3">
+                                            <p:txEl>
+                                              <p:pRg st="1" end="1"/>
+                                            </p:txEl>
+                                          </p:spTgt>
+                                        </p:tgtEl>
+                                      </p:cBhvr>
+                                    </p:animEffect>
+                                  </p:childTnLst>
+                                </p:cTn>
+                              </p:par>
+                            </p:childTnLst>
+                          </p:cTn>
+                        </p:par>
+                      </p:childTnLst>
+                    </p:cTn>
+                  </p:par>
+                  <p:par>
+                    <p:cTn id="11" fill="hold">
+                      <p:stCondLst>
+                        <p:cond delay="indefinite"/>
+                      </p:stCondLst>
+                      <p:childTnLst>
+                        <p:par>
+                          <p:cTn id="12" fill="hold">
+                            <p:stCondLst>
+                              <p:cond delay="0"/>
+                            </p:stCondLst>
+                            <p:childTnLst>
+                              <p:par>
+                                <p:cTn id="13" presetID="9" presetClass="entr" presetSubtype="0" fill="hold" grpId="0" nodeType="clickEffect">
+                                  <p:stCondLst>
+                                    <p:cond delay="0"/>
+                                  </p:stCondLst>
+                                  <p:childTnLst>
+                                    <p:set>
+                                      <p:cBhvr>
+                                        <p:cTn id="14" dur="1" fill="hold">
+                                          <p:stCondLst>
+                                            <p:cond delay="0"/>
+                                          </p:stCondLst>
+                                        </p:cTn>
+                                        <p:tgtEl>
+                                          <p:spTgt spid="3">
+                                            <p:txEl>
+                                              <p:pRg st="3" end="3"/>
+                                            </p:txEl>
+                                          </p:spTgt>
+                                        </p:tgtEl>
+                                        <p:attrNameLst>
+                                          <p:attrName>style.visibility</p:attrName>
+                                        </p:attrNameLst>
+                                      </p:cBhvr>
+                                      <p:to>
+                                        <p:strVal val="visible"/>
+                                      </p:to>
+                                    </p:set>
+                                    <p:animEffect transition="in" filter="dissolve">
+                                      <p:cBhvr>
+                                        <p:cTn id="15" dur="500"/>
+                                        <p:tgtEl>
+                                          <p:spTgt spid="3">
+                                            <p:txEl>
+                                              <p:pRg st="3" end="3"/>
+                                            </p:txEl>
+                                          </p:spTgt>
+                                        </p:tgtEl>
+                                      </p:cBhvr>
+                                    </p:animEffect>
+                                  </p:childTnLst>
+                                </p:cTn>
+                              </p:par>
+                            </p:childTnLst>
+                          </p:cTn>
+                        </p:par>
+                      </p:childTnLst>
+                    </p:cTn>
+                  </p:par>
+                  <p:par>
+                    <p:cTn id="16" fill="hold">
+                      <p:stCondLst>
+                        <p:cond delay="indefinite"/>
+                      </p:stCondLst>
+                      <p:childTnLst>
+                        <p:par>
+                          <p:cTn id="17" fill="hold">
+                            <p:stCondLst>
+                              <p:cond delay="0"/>
+                            </p:stCondLst>
+                            <p:childTnLst>
+                              <p:par>
+                                <p:cTn id="18" presetID="9" presetClass="entr" presetSubtype="0" fill="hold" grpId="0" nodeType="clickEffect">
+                                  <p:stCondLst>
+                                    <p:cond delay="0"/>
+                                  </p:stCondLst>
+                                  <p:childTnLst>
+                                    <p:set>
+                                      <p:cBhvr>
+                                        <p:cTn id="19" dur="1" fill="hold">
+                                          <p:stCondLst>
+                                            <p:cond delay="0"/>
+                                          </p:stCondLst>
+                                        </p:cTn>
+                                        <p:tgtEl>
+                                          <p:spTgt spid="3">
+                                            <p:txEl>
+                                              <p:pRg st="5" end="5"/>
+                                            </p:txEl>
+                                          </p:spTgt>
+                                        </p:tgtEl>
+                                        <p:attrNameLst>
+                                          <p:attrName>style.visibility</p:attrName>
+                                        </p:attrNameLst>
+                                      </p:cBhvr>
+                                      <p:to>
+                                        <p:strVal val="visible"/>
+                                      </p:to>
+                                    </p:set>
+                                    <p:animEffect transition="in" filter="dissolve">
+                                      <p:cBhvr>
+                                        <p:cTn id="20" dur="500"/>
+                                        <p:tgtEl>
+                                          <p:spTgt spid="3">
+                                            <p:txEl>
+                                              <p:pRg st="5" end="5"/>
+                                            </p:txEl>
+                                          </p:spTgt>
+                                        </p:tgtEl>
+                                      </p:cBhvr>
+                                    </p:animEffect>
+                                  </p:childTnLst>
+                                </p:cTn>
+                              </p:par>
+                            </p:childTnLst>
+                          </p:cTn>
+                        </p:par>
+                      </p:childTnLst>
+                    </p:cTn>
+                  </p:par>
+                  <p:par>
+                    <p:cTn id="21" fill="hold">
+                      <p:stCondLst>
+                        <p:cond delay="indefinite"/>
+                      </p:stCondLst>
+                      <p:childTnLst>
+                        <p:par>
+                          <p:cTn id="22" fill="hold">
+                            <p:stCondLst>
+                              <p:cond delay="0"/>
+                            </p:stCondLst>
+                            <p:childTnLst>
+                              <p:par>
+                                <p:cTn id="23" presetID="9" presetClass="entr" presetSubtype="0" fill="hold" grpId="0" nodeType="clickEffect">
+                                  <p:stCondLst>
+                                    <p:cond delay="0"/>
+                                  </p:stCondLst>
+                                  <p:childTnLst>
+                                    <p:set>
+                                      <p:cBhvr>
+                                        <p:cTn id="24" dur="1" fill="hold">
+                                          <p:stCondLst>
+                                            <p:cond delay="0"/>
+                                          </p:stCondLst>
+                                        </p:cTn>
+                                        <p:tgtEl>
+                                          <p:spTgt spid="3">
+                                            <p:txEl>
+                                              <p:pRg st="8" end="8"/>
+                                            </p:txEl>
+                                          </p:spTgt>
+                                        </p:tgtEl>
+                                        <p:attrNameLst>
+                                          <p:attrName>style.visibility</p:attrName>
+                                        </p:attrNameLst>
+                                      </p:cBhvr>
+                                      <p:to>
+                                        <p:strVal val="visible"/>
+                                      </p:to>
+                                    </p:set>
+                                    <p:animEffect transition="in" filter="dissolve">
+                                      <p:cBhvr>
+                                        <p:cTn id="25" dur="500"/>
+                                        <p:tgtEl>
+                                          <p:spTgt spid="3">
+                                            <p:txEl>
+                                              <p:pRg st="8" end="8"/>
+                                            </p:txEl>
+                                          </p:spTgt>
+                                        </p:tgtEl>
+                                      </p:cBhvr>
+                                    </p:animEffect>
+                                  </p:childTnLst>
+                                </p:cTn>
+                              </p:par>
+                            </p:childTnLst>
+                          </p:cTn>
+                        </p:par>
+                      </p:childTnLst>
+                    </p:cTn>
+                  </p:par>
+                  <p:par>
+                    <p:cTn id="26" fill="hold">
+                      <p:stCondLst>
+                        <p:cond delay="indefinite"/>
+                      </p:stCondLst>
+                      <p:childTnLst>
+                        <p:par>
+                          <p:cTn id="27" fill="hold">
+                            <p:stCondLst>
+                              <p:cond delay="0"/>
+                            </p:stCondLst>
+                            <p:childTnLst>
+                              <p:par>
+                                <p:cTn id="28" presetID="9" presetClass="entr" presetSubtype="0" fill="hold" nodeType="clickEffect">
+                                  <p:stCondLst>
+                                    <p:cond delay="0"/>
+                                  </p:stCondLst>
+                                  <p:childTnLst>
+                                    <p:set>
+                                      <p:cBhvr>
+                                        <p:cTn id="29" dur="1" fill="hold">
+                                          <p:stCondLst>
+                                            <p:cond delay="0"/>
+                                          </p:stCondLst>
+                                        </p:cTn>
+                                        <p:tgtEl>
+                                          <p:spTgt spid="5"/>
+                                        </p:tgtEl>
+                                        <p:attrNameLst>
+                                          <p:attrName>style.visibility</p:attrName>
+                                        </p:attrNameLst>
+                                      </p:cBhvr>
+                                      <p:to>
+                                        <p:strVal val="visible"/>
+                                      </p:to>
+                                    </p:set>
+                                    <p:animEffect transition="in" filter="dissolve">
+                                      <p:cBhvr>
+                                        <p:cTn id="30" dur="500"/>
+                                        <p:tgtEl>
+                                          <p:spTgt spid="5"/>
+                                        </p:tgtEl>
+                                      </p:cBhvr>
+                                    </p:animEffect>
+                                  </p:childTnLst>
+                                </p:cTn>
+                              </p:par>
+                            </p:childTnLst>
+                          </p:cTn>
+                        </p:par>
+                      </p:childTnLst>
+                    </p:cTn>
+                  </p:par>
+                </p:childTnLst>
+              </p:cTn>
+              <p:prevCondLst>
+                <p:cond evt="onPrev" delay="0">
+                  <p:tgtEl>
+                    <p:sldTgt/>
+                  </p:tgtEl>
+                </p:cond>
+              </p:prevCondLst>
+              <p:nextCondLst>
+                <p:cond evt="onNext" delay="0">
+                  <p:tgtEl>
+                    <p:sldTgt/>
+                  </p:tgtEl>
+                </p:cond>
+              </p:nextCondLst>
+            </p:seq>
+          </p:childTnLst>
+        </p:cTn>
       </p:par>
     </p:tnLst>
+    <p:bldLst>
+      <p:bldP spid="3" grpId="0" uiExpand="1" build="p"/>
+    </p:bldLst>
   </p:timing>
 </p:sld>
 </file>

</xml_diff>